<commit_message>
Qt insert button teaching button and cartesian enable SCADA inserted cartesian enable Paper, inserted SCADA Section
</commit_message>
<xml_diff>
--- a/Relatorio/Imagens.pptx
+++ b/Relatorio/Imagens.pptx
@@ -9,6 +9,11 @@
     <p:sldId id="257" r:id="rId3"/>
     <p:sldId id="258" r:id="rId4"/>
     <p:sldId id="259" r:id="rId5"/>
+    <p:sldId id="260" r:id="rId6"/>
+    <p:sldId id="261" r:id="rId7"/>
+    <p:sldId id="262" r:id="rId8"/>
+    <p:sldId id="263" r:id="rId9"/>
+    <p:sldId id="264" r:id="rId10"/>
   </p:sldIdLst>
   <p:sldSz cx="12192000" cy="6858000"/>
   <p:notesSz cx="6858000" cy="9144000"/>
@@ -107,6 +112,11 @@
       </a:defRPr>
     </a:lvl9pPr>
   </p:defaultTextStyle>
+  <p:extLst>
+    <p:ext uri="{EFAFB233-063F-42B5-8137-9DF3F51BA10A}">
+      <p15:sldGuideLst xmlns:p15="http://schemas.microsoft.com/office/powerpoint/2012/main"/>
+    </p:ext>
+  </p:extLst>
 </p:presentation>
 </file>
 
@@ -257,7 +267,7 @@
           <a:p>
             <a:fld id="{288D8905-2724-49C2-A645-FD965E6C5596}" type="datetimeFigureOut">
               <a:rPr lang="pt-PT" smtClean="0"/>
-              <a:t>10/02/2020</a:t>
+              <a:t>11/02/2020</a:t>
             </a:fld>
             <a:endParaRPr lang="pt-PT"/>
           </a:p>
@@ -455,7 +465,7 @@
           <a:p>
             <a:fld id="{288D8905-2724-49C2-A645-FD965E6C5596}" type="datetimeFigureOut">
               <a:rPr lang="pt-PT" smtClean="0"/>
-              <a:t>10/02/2020</a:t>
+              <a:t>11/02/2020</a:t>
             </a:fld>
             <a:endParaRPr lang="pt-PT"/>
           </a:p>
@@ -663,7 +673,7 @@
           <a:p>
             <a:fld id="{288D8905-2724-49C2-A645-FD965E6C5596}" type="datetimeFigureOut">
               <a:rPr lang="pt-PT" smtClean="0"/>
-              <a:t>10/02/2020</a:t>
+              <a:t>11/02/2020</a:t>
             </a:fld>
             <a:endParaRPr lang="pt-PT"/>
           </a:p>
@@ -861,7 +871,7 @@
           <a:p>
             <a:fld id="{288D8905-2724-49C2-A645-FD965E6C5596}" type="datetimeFigureOut">
               <a:rPr lang="pt-PT" smtClean="0"/>
-              <a:t>10/02/2020</a:t>
+              <a:t>11/02/2020</a:t>
             </a:fld>
             <a:endParaRPr lang="pt-PT"/>
           </a:p>
@@ -1136,7 +1146,7 @@
           <a:p>
             <a:fld id="{288D8905-2724-49C2-A645-FD965E6C5596}" type="datetimeFigureOut">
               <a:rPr lang="pt-PT" smtClean="0"/>
-              <a:t>10/02/2020</a:t>
+              <a:t>11/02/2020</a:t>
             </a:fld>
             <a:endParaRPr lang="pt-PT"/>
           </a:p>
@@ -1401,7 +1411,7 @@
           <a:p>
             <a:fld id="{288D8905-2724-49C2-A645-FD965E6C5596}" type="datetimeFigureOut">
               <a:rPr lang="pt-PT" smtClean="0"/>
-              <a:t>10/02/2020</a:t>
+              <a:t>11/02/2020</a:t>
             </a:fld>
             <a:endParaRPr lang="pt-PT"/>
           </a:p>
@@ -1813,7 +1823,7 @@
           <a:p>
             <a:fld id="{288D8905-2724-49C2-A645-FD965E6C5596}" type="datetimeFigureOut">
               <a:rPr lang="pt-PT" smtClean="0"/>
-              <a:t>10/02/2020</a:t>
+              <a:t>11/02/2020</a:t>
             </a:fld>
             <a:endParaRPr lang="pt-PT"/>
           </a:p>
@@ -1954,7 +1964,7 @@
           <a:p>
             <a:fld id="{288D8905-2724-49C2-A645-FD965E6C5596}" type="datetimeFigureOut">
               <a:rPr lang="pt-PT" smtClean="0"/>
-              <a:t>10/02/2020</a:t>
+              <a:t>11/02/2020</a:t>
             </a:fld>
             <a:endParaRPr lang="pt-PT"/>
           </a:p>
@@ -2067,7 +2077,7 @@
           <a:p>
             <a:fld id="{288D8905-2724-49C2-A645-FD965E6C5596}" type="datetimeFigureOut">
               <a:rPr lang="pt-PT" smtClean="0"/>
-              <a:t>10/02/2020</a:t>
+              <a:t>11/02/2020</a:t>
             </a:fld>
             <a:endParaRPr lang="pt-PT"/>
           </a:p>
@@ -2378,7 +2388,7 @@
           <a:p>
             <a:fld id="{288D8905-2724-49C2-A645-FD965E6C5596}" type="datetimeFigureOut">
               <a:rPr lang="pt-PT" smtClean="0"/>
-              <a:t>10/02/2020</a:t>
+              <a:t>11/02/2020</a:t>
             </a:fld>
             <a:endParaRPr lang="pt-PT"/>
           </a:p>
@@ -2666,7 +2676,7 @@
           <a:p>
             <a:fld id="{288D8905-2724-49C2-A645-FD965E6C5596}" type="datetimeFigureOut">
               <a:rPr lang="pt-PT" smtClean="0"/>
-              <a:t>10/02/2020</a:t>
+              <a:t>11/02/2020</a:t>
             </a:fld>
             <a:endParaRPr lang="pt-PT"/>
           </a:p>
@@ -2907,7 +2917,7 @@
           <a:p>
             <a:fld id="{288D8905-2724-49C2-A645-FD965E6C5596}" type="datetimeFigureOut">
               <a:rPr lang="pt-PT" smtClean="0"/>
-              <a:t>10/02/2020</a:t>
+              <a:t>11/02/2020</a:t>
             </a:fld>
             <a:endParaRPr lang="pt-PT"/>
           </a:p>
@@ -6082,6 +6092,1419 @@
 </p:sld>
 </file>
 
+<file path=ppt/slides/slide5.xml><?xml version="1.0" encoding="utf-8"?>
+<p:sld xmlns:a="http://schemas.openxmlformats.org/drawingml/2006/main" xmlns:r="http://schemas.openxmlformats.org/officeDocument/2006/relationships" xmlns:p="http://schemas.openxmlformats.org/presentationml/2006/main">
+  <p:cSld>
+    <p:spTree>
+      <p:nvGrpSpPr>
+        <p:cNvPr id="1" name=""/>
+        <p:cNvGrpSpPr/>
+        <p:nvPr/>
+      </p:nvGrpSpPr>
+      <p:grpSpPr>
+        <a:xfrm>
+          <a:off x="0" y="0"/>
+          <a:ext cx="0" cy="0"/>
+          <a:chOff x="0" y="0"/>
+          <a:chExt cx="0" cy="0"/>
+        </a:xfrm>
+      </p:grpSpPr>
+      <p:pic>
+        <p:nvPicPr>
+          <p:cNvPr id="8" name="Imagem 7">
+            <a:extLst>
+              <a:ext uri="{FF2B5EF4-FFF2-40B4-BE49-F238E27FC236}">
+                <a16:creationId xmlns:a16="http://schemas.microsoft.com/office/drawing/2014/main" id="{7D72782B-E068-4FB5-B314-EA03DF2B24DF}"/>
+              </a:ext>
+            </a:extLst>
+          </p:cNvPr>
+          <p:cNvPicPr>
+            <a:picLocks noChangeAspect="1"/>
+          </p:cNvPicPr>
+          <p:nvPr/>
+        </p:nvPicPr>
+        <p:blipFill>
+          <a:blip r:embed="rId2"/>
+          <a:stretch>
+            <a:fillRect/>
+          </a:stretch>
+        </p:blipFill>
+        <p:spPr>
+          <a:xfrm>
+            <a:off x="0" y="158518"/>
+            <a:ext cx="12192000" cy="6540964"/>
+          </a:xfrm>
+          <a:prstGeom prst="rect">
+            <a:avLst/>
+          </a:prstGeom>
+        </p:spPr>
+      </p:pic>
+      <p:sp>
+        <p:nvSpPr>
+          <p:cNvPr id="5" name="Oval 4">
+            <a:extLst>
+              <a:ext uri="{FF2B5EF4-FFF2-40B4-BE49-F238E27FC236}">
+                <a16:creationId xmlns:a16="http://schemas.microsoft.com/office/drawing/2014/main" id="{53C9A093-5C7B-43EE-8C35-2E5DF63560C1}"/>
+              </a:ext>
+            </a:extLst>
+          </p:cNvPr>
+          <p:cNvSpPr/>
+          <p:nvPr/>
+        </p:nvSpPr>
+        <p:spPr>
+          <a:xfrm>
+            <a:off x="0" y="373716"/>
+            <a:ext cx="190500" cy="209550"/>
+          </a:xfrm>
+          <a:prstGeom prst="ellipse">
+            <a:avLst/>
+          </a:prstGeom>
+          <a:solidFill>
+            <a:schemeClr val="bg1"/>
+          </a:solidFill>
+          <a:ln w="38100">
+            <a:solidFill>
+              <a:srgbClr val="FF0000"/>
+            </a:solidFill>
+          </a:ln>
+        </p:spPr>
+        <p:style>
+          <a:lnRef idx="2">
+            <a:schemeClr val="accent1">
+              <a:shade val="50000"/>
+            </a:schemeClr>
+          </a:lnRef>
+          <a:fillRef idx="1">
+            <a:schemeClr val="accent1"/>
+          </a:fillRef>
+          <a:effectRef idx="0">
+            <a:schemeClr val="accent1"/>
+          </a:effectRef>
+          <a:fontRef idx="minor">
+            <a:schemeClr val="lt1"/>
+          </a:fontRef>
+        </p:style>
+        <p:txBody>
+          <a:bodyPr rtlCol="0" anchor="ctr"/>
+          <a:lstStyle/>
+          <a:p>
+            <a:pPr algn="ctr"/>
+            <a:r>
+              <a:rPr lang="pt-PT" sz="1100" dirty="0">
+                <a:solidFill>
+                  <a:schemeClr val="tx1"/>
+                </a:solidFill>
+              </a:rPr>
+              <a:t>1</a:t>
+            </a:r>
+          </a:p>
+        </p:txBody>
+      </p:sp>
+      <p:sp>
+        <p:nvSpPr>
+          <p:cNvPr id="6" name="Oval 5">
+            <a:extLst>
+              <a:ext uri="{FF2B5EF4-FFF2-40B4-BE49-F238E27FC236}">
+                <a16:creationId xmlns:a16="http://schemas.microsoft.com/office/drawing/2014/main" id="{993BD2F3-2D7F-4FCF-A96B-C926B84BCDFD}"/>
+              </a:ext>
+            </a:extLst>
+          </p:cNvPr>
+          <p:cNvSpPr/>
+          <p:nvPr/>
+        </p:nvSpPr>
+        <p:spPr>
+          <a:xfrm>
+            <a:off x="1921249" y="373716"/>
+            <a:ext cx="190500" cy="209550"/>
+          </a:xfrm>
+          <a:prstGeom prst="ellipse">
+            <a:avLst/>
+          </a:prstGeom>
+          <a:solidFill>
+            <a:schemeClr val="bg1"/>
+          </a:solidFill>
+          <a:ln w="38100">
+            <a:solidFill>
+              <a:srgbClr val="FF0000"/>
+            </a:solidFill>
+          </a:ln>
+        </p:spPr>
+        <p:style>
+          <a:lnRef idx="2">
+            <a:schemeClr val="accent1">
+              <a:shade val="50000"/>
+            </a:schemeClr>
+          </a:lnRef>
+          <a:fillRef idx="1">
+            <a:schemeClr val="accent1"/>
+          </a:fillRef>
+          <a:effectRef idx="0">
+            <a:schemeClr val="accent1"/>
+          </a:effectRef>
+          <a:fontRef idx="minor">
+            <a:schemeClr val="lt1"/>
+          </a:fontRef>
+        </p:style>
+        <p:txBody>
+          <a:bodyPr rtlCol="0" anchor="ctr"/>
+          <a:lstStyle/>
+          <a:p>
+            <a:pPr algn="ctr"/>
+            <a:r>
+              <a:rPr lang="pt-PT" sz="1100" dirty="0">
+                <a:solidFill>
+                  <a:schemeClr val="tx1"/>
+                </a:solidFill>
+              </a:rPr>
+              <a:t>2</a:t>
+            </a:r>
+          </a:p>
+        </p:txBody>
+      </p:sp>
+      <p:sp>
+        <p:nvSpPr>
+          <p:cNvPr id="7" name="Oval 6">
+            <a:extLst>
+              <a:ext uri="{FF2B5EF4-FFF2-40B4-BE49-F238E27FC236}">
+                <a16:creationId xmlns:a16="http://schemas.microsoft.com/office/drawing/2014/main" id="{4C1FB909-B2CD-4EB1-A488-27AA3F914AA3}"/>
+              </a:ext>
+            </a:extLst>
+          </p:cNvPr>
+          <p:cNvSpPr/>
+          <p:nvPr/>
+        </p:nvSpPr>
+        <p:spPr>
+          <a:xfrm>
+            <a:off x="415178" y="741269"/>
+            <a:ext cx="190500" cy="209550"/>
+          </a:xfrm>
+          <a:prstGeom prst="ellipse">
+            <a:avLst/>
+          </a:prstGeom>
+          <a:solidFill>
+            <a:schemeClr val="bg1"/>
+          </a:solidFill>
+          <a:ln w="38100">
+            <a:solidFill>
+              <a:srgbClr val="FF0000"/>
+            </a:solidFill>
+          </a:ln>
+        </p:spPr>
+        <p:style>
+          <a:lnRef idx="2">
+            <a:schemeClr val="accent1">
+              <a:shade val="50000"/>
+            </a:schemeClr>
+          </a:lnRef>
+          <a:fillRef idx="1">
+            <a:schemeClr val="accent1"/>
+          </a:fillRef>
+          <a:effectRef idx="0">
+            <a:schemeClr val="accent1"/>
+          </a:effectRef>
+          <a:fontRef idx="minor">
+            <a:schemeClr val="lt1"/>
+          </a:fontRef>
+        </p:style>
+        <p:txBody>
+          <a:bodyPr rtlCol="0" anchor="ctr"/>
+          <a:lstStyle/>
+          <a:p>
+            <a:pPr algn="ctr"/>
+            <a:r>
+              <a:rPr lang="pt-PT" sz="1100" dirty="0">
+                <a:solidFill>
+                  <a:schemeClr val="tx1"/>
+                </a:solidFill>
+              </a:rPr>
+              <a:t>3</a:t>
+            </a:r>
+          </a:p>
+        </p:txBody>
+      </p:sp>
+      <p:sp>
+        <p:nvSpPr>
+          <p:cNvPr id="10" name="Oval 9">
+            <a:extLst>
+              <a:ext uri="{FF2B5EF4-FFF2-40B4-BE49-F238E27FC236}">
+                <a16:creationId xmlns:a16="http://schemas.microsoft.com/office/drawing/2014/main" id="{15CAADAB-B40F-499B-8ED9-DDBE73E58422}"/>
+              </a:ext>
+            </a:extLst>
+          </p:cNvPr>
+          <p:cNvSpPr/>
+          <p:nvPr/>
+        </p:nvSpPr>
+        <p:spPr>
+          <a:xfrm>
+            <a:off x="95250" y="1027019"/>
+            <a:ext cx="190500" cy="209550"/>
+          </a:xfrm>
+          <a:prstGeom prst="ellipse">
+            <a:avLst/>
+          </a:prstGeom>
+          <a:solidFill>
+            <a:schemeClr val="bg1"/>
+          </a:solidFill>
+          <a:ln w="38100">
+            <a:solidFill>
+              <a:srgbClr val="FF0000"/>
+            </a:solidFill>
+          </a:ln>
+        </p:spPr>
+        <p:style>
+          <a:lnRef idx="2">
+            <a:schemeClr val="accent1">
+              <a:shade val="50000"/>
+            </a:schemeClr>
+          </a:lnRef>
+          <a:fillRef idx="1">
+            <a:schemeClr val="accent1"/>
+          </a:fillRef>
+          <a:effectRef idx="0">
+            <a:schemeClr val="accent1"/>
+          </a:effectRef>
+          <a:fontRef idx="minor">
+            <a:schemeClr val="lt1"/>
+          </a:fontRef>
+        </p:style>
+        <p:txBody>
+          <a:bodyPr rtlCol="0" anchor="ctr"/>
+          <a:lstStyle/>
+          <a:p>
+            <a:pPr algn="ctr"/>
+            <a:r>
+              <a:rPr lang="pt-PT" sz="1100" dirty="0">
+                <a:solidFill>
+                  <a:schemeClr val="tx1"/>
+                </a:solidFill>
+              </a:rPr>
+              <a:t>4</a:t>
+            </a:r>
+          </a:p>
+        </p:txBody>
+      </p:sp>
+      <p:sp>
+        <p:nvSpPr>
+          <p:cNvPr id="11" name="Oval 10">
+            <a:extLst>
+              <a:ext uri="{FF2B5EF4-FFF2-40B4-BE49-F238E27FC236}">
+                <a16:creationId xmlns:a16="http://schemas.microsoft.com/office/drawing/2014/main" id="{21A015BB-8B6A-42BC-B155-0D4F685D7560}"/>
+              </a:ext>
+            </a:extLst>
+          </p:cNvPr>
+          <p:cNvSpPr/>
+          <p:nvPr/>
+        </p:nvSpPr>
+        <p:spPr>
+          <a:xfrm>
+            <a:off x="224678" y="1394572"/>
+            <a:ext cx="190500" cy="209550"/>
+          </a:xfrm>
+          <a:prstGeom prst="ellipse">
+            <a:avLst/>
+          </a:prstGeom>
+          <a:solidFill>
+            <a:schemeClr val="bg1"/>
+          </a:solidFill>
+          <a:ln w="38100">
+            <a:solidFill>
+              <a:srgbClr val="FF0000"/>
+            </a:solidFill>
+          </a:ln>
+        </p:spPr>
+        <p:style>
+          <a:lnRef idx="2">
+            <a:schemeClr val="accent1">
+              <a:shade val="50000"/>
+            </a:schemeClr>
+          </a:lnRef>
+          <a:fillRef idx="1">
+            <a:schemeClr val="accent1"/>
+          </a:fillRef>
+          <a:effectRef idx="0">
+            <a:schemeClr val="accent1"/>
+          </a:effectRef>
+          <a:fontRef idx="minor">
+            <a:schemeClr val="lt1"/>
+          </a:fontRef>
+        </p:style>
+        <p:txBody>
+          <a:bodyPr rtlCol="0" anchor="ctr"/>
+          <a:lstStyle/>
+          <a:p>
+            <a:pPr algn="ctr"/>
+            <a:r>
+              <a:rPr lang="pt-PT" sz="1100" dirty="0">
+                <a:solidFill>
+                  <a:schemeClr val="tx1"/>
+                </a:solidFill>
+              </a:rPr>
+              <a:t>6</a:t>
+            </a:r>
+          </a:p>
+        </p:txBody>
+      </p:sp>
+      <p:sp>
+        <p:nvSpPr>
+          <p:cNvPr id="12" name="Oval 11">
+            <a:extLst>
+              <a:ext uri="{FF2B5EF4-FFF2-40B4-BE49-F238E27FC236}">
+                <a16:creationId xmlns:a16="http://schemas.microsoft.com/office/drawing/2014/main" id="{8281AC01-D4AC-472B-BB09-6338C7875E08}"/>
+              </a:ext>
+            </a:extLst>
+          </p:cNvPr>
+          <p:cNvSpPr/>
+          <p:nvPr/>
+        </p:nvSpPr>
+        <p:spPr>
+          <a:xfrm>
+            <a:off x="1581150" y="2131919"/>
+            <a:ext cx="190500" cy="209550"/>
+          </a:xfrm>
+          <a:prstGeom prst="ellipse">
+            <a:avLst/>
+          </a:prstGeom>
+          <a:solidFill>
+            <a:schemeClr val="bg1"/>
+          </a:solidFill>
+          <a:ln w="38100">
+            <a:solidFill>
+              <a:srgbClr val="FF0000"/>
+            </a:solidFill>
+          </a:ln>
+        </p:spPr>
+        <p:style>
+          <a:lnRef idx="2">
+            <a:schemeClr val="accent1">
+              <a:shade val="50000"/>
+            </a:schemeClr>
+          </a:lnRef>
+          <a:fillRef idx="1">
+            <a:schemeClr val="accent1"/>
+          </a:fillRef>
+          <a:effectRef idx="0">
+            <a:schemeClr val="accent1"/>
+          </a:effectRef>
+          <a:fontRef idx="minor">
+            <a:schemeClr val="lt1"/>
+          </a:fontRef>
+        </p:style>
+        <p:txBody>
+          <a:bodyPr rtlCol="0" anchor="ctr"/>
+          <a:lstStyle/>
+          <a:p>
+            <a:pPr algn="ctr"/>
+            <a:r>
+              <a:rPr lang="pt-PT" sz="1100" dirty="0">
+                <a:solidFill>
+                  <a:schemeClr val="tx1"/>
+                </a:solidFill>
+              </a:rPr>
+              <a:t>7</a:t>
+            </a:r>
+          </a:p>
+        </p:txBody>
+      </p:sp>
+      <p:sp>
+        <p:nvSpPr>
+          <p:cNvPr id="13" name="Oval 12">
+            <a:extLst>
+              <a:ext uri="{FF2B5EF4-FFF2-40B4-BE49-F238E27FC236}">
+                <a16:creationId xmlns:a16="http://schemas.microsoft.com/office/drawing/2014/main" id="{22FC64E1-0547-4289-8D70-3F39A46FFD64}"/>
+              </a:ext>
+            </a:extLst>
+          </p:cNvPr>
+          <p:cNvSpPr/>
+          <p:nvPr/>
+        </p:nvSpPr>
+        <p:spPr>
+          <a:xfrm>
+            <a:off x="3190875" y="846044"/>
+            <a:ext cx="190500" cy="209550"/>
+          </a:xfrm>
+          <a:prstGeom prst="ellipse">
+            <a:avLst/>
+          </a:prstGeom>
+          <a:solidFill>
+            <a:schemeClr val="bg1"/>
+          </a:solidFill>
+          <a:ln w="38100">
+            <a:solidFill>
+              <a:srgbClr val="FF0000"/>
+            </a:solidFill>
+          </a:ln>
+        </p:spPr>
+        <p:style>
+          <a:lnRef idx="2">
+            <a:schemeClr val="accent1">
+              <a:shade val="50000"/>
+            </a:schemeClr>
+          </a:lnRef>
+          <a:fillRef idx="1">
+            <a:schemeClr val="accent1"/>
+          </a:fillRef>
+          <a:effectRef idx="0">
+            <a:schemeClr val="accent1"/>
+          </a:effectRef>
+          <a:fontRef idx="minor">
+            <a:schemeClr val="lt1"/>
+          </a:fontRef>
+        </p:style>
+        <p:txBody>
+          <a:bodyPr rtlCol="0" anchor="ctr"/>
+          <a:lstStyle/>
+          <a:p>
+            <a:pPr algn="ctr"/>
+            <a:r>
+              <a:rPr lang="pt-PT" sz="1100" dirty="0">
+                <a:solidFill>
+                  <a:schemeClr val="tx1"/>
+                </a:solidFill>
+              </a:rPr>
+              <a:t>5</a:t>
+            </a:r>
+          </a:p>
+        </p:txBody>
+      </p:sp>
+      <p:sp>
+        <p:nvSpPr>
+          <p:cNvPr id="14" name="Oval 13">
+            <a:extLst>
+              <a:ext uri="{FF2B5EF4-FFF2-40B4-BE49-F238E27FC236}">
+                <a16:creationId xmlns:a16="http://schemas.microsoft.com/office/drawing/2014/main" id="{53EA15AA-F8B3-4A39-9444-19176DDB2876}"/>
+              </a:ext>
+            </a:extLst>
+          </p:cNvPr>
+          <p:cNvSpPr/>
+          <p:nvPr/>
+        </p:nvSpPr>
+        <p:spPr>
+          <a:xfrm>
+            <a:off x="3152775" y="1533570"/>
+            <a:ext cx="190500" cy="209550"/>
+          </a:xfrm>
+          <a:prstGeom prst="ellipse">
+            <a:avLst/>
+          </a:prstGeom>
+          <a:solidFill>
+            <a:schemeClr val="bg1"/>
+          </a:solidFill>
+          <a:ln w="38100">
+            <a:solidFill>
+              <a:srgbClr val="FF0000"/>
+            </a:solidFill>
+          </a:ln>
+        </p:spPr>
+        <p:style>
+          <a:lnRef idx="2">
+            <a:schemeClr val="accent1">
+              <a:shade val="50000"/>
+            </a:schemeClr>
+          </a:lnRef>
+          <a:fillRef idx="1">
+            <a:schemeClr val="accent1"/>
+          </a:fillRef>
+          <a:effectRef idx="0">
+            <a:schemeClr val="accent1"/>
+          </a:effectRef>
+          <a:fontRef idx="minor">
+            <a:schemeClr val="lt1"/>
+          </a:fontRef>
+        </p:style>
+        <p:txBody>
+          <a:bodyPr rtlCol="0" anchor="ctr"/>
+          <a:lstStyle/>
+          <a:p>
+            <a:pPr algn="ctr"/>
+            <a:r>
+              <a:rPr lang="pt-PT" sz="1100" dirty="0">
+                <a:solidFill>
+                  <a:schemeClr val="tx1"/>
+                </a:solidFill>
+              </a:rPr>
+              <a:t>8</a:t>
+            </a:r>
+          </a:p>
+        </p:txBody>
+      </p:sp>
+      <p:sp>
+        <p:nvSpPr>
+          <p:cNvPr id="15" name="Oval 14">
+            <a:extLst>
+              <a:ext uri="{FF2B5EF4-FFF2-40B4-BE49-F238E27FC236}">
+                <a16:creationId xmlns:a16="http://schemas.microsoft.com/office/drawing/2014/main" id="{5B1BBC12-CF91-428B-A08A-233955E6547A}"/>
+              </a:ext>
+            </a:extLst>
+          </p:cNvPr>
+          <p:cNvSpPr/>
+          <p:nvPr/>
+        </p:nvSpPr>
+        <p:spPr>
+          <a:xfrm>
+            <a:off x="3190875" y="2325871"/>
+            <a:ext cx="190500" cy="209550"/>
+          </a:xfrm>
+          <a:prstGeom prst="ellipse">
+            <a:avLst/>
+          </a:prstGeom>
+          <a:solidFill>
+            <a:schemeClr val="bg1"/>
+          </a:solidFill>
+          <a:ln w="38100">
+            <a:solidFill>
+              <a:srgbClr val="FF0000"/>
+            </a:solidFill>
+          </a:ln>
+        </p:spPr>
+        <p:style>
+          <a:lnRef idx="2">
+            <a:schemeClr val="accent1">
+              <a:shade val="50000"/>
+            </a:schemeClr>
+          </a:lnRef>
+          <a:fillRef idx="1">
+            <a:schemeClr val="accent1"/>
+          </a:fillRef>
+          <a:effectRef idx="0">
+            <a:schemeClr val="accent1"/>
+          </a:effectRef>
+          <a:fontRef idx="minor">
+            <a:schemeClr val="lt1"/>
+          </a:fontRef>
+        </p:style>
+        <p:txBody>
+          <a:bodyPr rtlCol="0" anchor="ctr"/>
+          <a:lstStyle/>
+          <a:p>
+            <a:pPr algn="ctr"/>
+            <a:r>
+              <a:rPr lang="pt-PT" sz="1100" dirty="0">
+                <a:solidFill>
+                  <a:schemeClr val="tx1"/>
+                </a:solidFill>
+              </a:rPr>
+              <a:t>9</a:t>
+            </a:r>
+          </a:p>
+        </p:txBody>
+      </p:sp>
+      <p:pic>
+        <p:nvPicPr>
+          <p:cNvPr id="21" name="Imagem 20">
+            <a:extLst>
+              <a:ext uri="{FF2B5EF4-FFF2-40B4-BE49-F238E27FC236}">
+                <a16:creationId xmlns:a16="http://schemas.microsoft.com/office/drawing/2014/main" id="{8667F764-3055-439A-9756-DEB4E9DAF961}"/>
+              </a:ext>
+            </a:extLst>
+          </p:cNvPr>
+          <p:cNvPicPr>
+            <a:picLocks noChangeAspect="1"/>
+          </p:cNvPicPr>
+          <p:nvPr/>
+        </p:nvPicPr>
+        <p:blipFill>
+          <a:blip r:embed="rId3"/>
+          <a:stretch>
+            <a:fillRect/>
+          </a:stretch>
+        </p:blipFill>
+        <p:spPr>
+          <a:xfrm>
+            <a:off x="3094603" y="3118171"/>
+            <a:ext cx="252000" cy="246071"/>
+          </a:xfrm>
+          <a:prstGeom prst="rect">
+            <a:avLst/>
+          </a:prstGeom>
+        </p:spPr>
+      </p:pic>
+      <p:pic>
+        <p:nvPicPr>
+          <p:cNvPr id="22" name="Imagem 21">
+            <a:extLst>
+              <a:ext uri="{FF2B5EF4-FFF2-40B4-BE49-F238E27FC236}">
+                <a16:creationId xmlns:a16="http://schemas.microsoft.com/office/drawing/2014/main" id="{83D5EAB7-5F26-4D7B-992B-C10010B18594}"/>
+              </a:ext>
+            </a:extLst>
+          </p:cNvPr>
+          <p:cNvPicPr>
+            <a:picLocks noChangeAspect="1"/>
+          </p:cNvPicPr>
+          <p:nvPr/>
+        </p:nvPicPr>
+        <p:blipFill>
+          <a:blip r:embed="rId4"/>
+          <a:stretch>
+            <a:fillRect/>
+          </a:stretch>
+        </p:blipFill>
+        <p:spPr>
+          <a:xfrm>
+            <a:off x="4115675" y="3129939"/>
+            <a:ext cx="252000" cy="246071"/>
+          </a:xfrm>
+          <a:prstGeom prst="rect">
+            <a:avLst/>
+          </a:prstGeom>
+        </p:spPr>
+      </p:pic>
+      <p:pic>
+        <p:nvPicPr>
+          <p:cNvPr id="26" name="Imagem 25">
+            <a:extLst>
+              <a:ext uri="{FF2B5EF4-FFF2-40B4-BE49-F238E27FC236}">
+                <a16:creationId xmlns:a16="http://schemas.microsoft.com/office/drawing/2014/main" id="{3DBDD002-2EFE-4203-9468-A5650997C32F}"/>
+              </a:ext>
+            </a:extLst>
+          </p:cNvPr>
+          <p:cNvPicPr>
+            <a:picLocks noChangeAspect="1"/>
+          </p:cNvPicPr>
+          <p:nvPr/>
+        </p:nvPicPr>
+        <p:blipFill>
+          <a:blip r:embed="rId5"/>
+          <a:stretch>
+            <a:fillRect/>
+          </a:stretch>
+        </p:blipFill>
+        <p:spPr>
+          <a:xfrm>
+            <a:off x="5010747" y="3118171"/>
+            <a:ext cx="252000" cy="246070"/>
+          </a:xfrm>
+          <a:prstGeom prst="rect">
+            <a:avLst/>
+          </a:prstGeom>
+        </p:spPr>
+      </p:pic>
+    </p:spTree>
+    <p:extLst>
+      <p:ext uri="{BB962C8B-B14F-4D97-AF65-F5344CB8AC3E}">
+        <p14:creationId xmlns:p14="http://schemas.microsoft.com/office/powerpoint/2010/main" val="1682393006"/>
+      </p:ext>
+    </p:extLst>
+  </p:cSld>
+  <p:clrMapOvr>
+    <a:masterClrMapping/>
+  </p:clrMapOvr>
+</p:sld>
+</file>
+
+<file path=ppt/slides/slide6.xml><?xml version="1.0" encoding="utf-8"?>
+<p:sld xmlns:a="http://schemas.openxmlformats.org/drawingml/2006/main" xmlns:r="http://schemas.openxmlformats.org/officeDocument/2006/relationships" xmlns:p="http://schemas.openxmlformats.org/presentationml/2006/main">
+  <p:cSld>
+    <p:spTree>
+      <p:nvGrpSpPr>
+        <p:cNvPr id="1" name=""/>
+        <p:cNvGrpSpPr/>
+        <p:nvPr/>
+      </p:nvGrpSpPr>
+      <p:grpSpPr>
+        <a:xfrm>
+          <a:off x="0" y="0"/>
+          <a:ext cx="0" cy="0"/>
+          <a:chOff x="0" y="0"/>
+          <a:chExt cx="0" cy="0"/>
+        </a:xfrm>
+      </p:grpSpPr>
+      <p:pic>
+        <p:nvPicPr>
+          <p:cNvPr id="23" name="Imagem 22">
+            <a:extLst>
+              <a:ext uri="{FF2B5EF4-FFF2-40B4-BE49-F238E27FC236}">
+                <a16:creationId xmlns:a16="http://schemas.microsoft.com/office/drawing/2014/main" id="{ACA21E1E-4EA6-497D-B34D-2BF8038DB3B9}"/>
+              </a:ext>
+            </a:extLst>
+          </p:cNvPr>
+          <p:cNvPicPr>
+            <a:picLocks noChangeAspect="1"/>
+          </p:cNvPicPr>
+          <p:nvPr/>
+        </p:nvPicPr>
+        <p:blipFill>
+          <a:blip r:embed="rId2"/>
+          <a:stretch>
+            <a:fillRect/>
+          </a:stretch>
+        </p:blipFill>
+        <p:spPr>
+          <a:xfrm>
+            <a:off x="0" y="158518"/>
+            <a:ext cx="12192000" cy="6540964"/>
+          </a:xfrm>
+          <a:prstGeom prst="rect">
+            <a:avLst/>
+          </a:prstGeom>
+        </p:spPr>
+      </p:pic>
+      <p:pic>
+        <p:nvPicPr>
+          <p:cNvPr id="8" name="Imagem 7">
+            <a:extLst>
+              <a:ext uri="{FF2B5EF4-FFF2-40B4-BE49-F238E27FC236}">
+                <a16:creationId xmlns:a16="http://schemas.microsoft.com/office/drawing/2014/main" id="{6BE1719A-10EA-4D42-A852-378453F919E5}"/>
+              </a:ext>
+            </a:extLst>
+          </p:cNvPr>
+          <p:cNvPicPr>
+            <a:picLocks noChangeAspect="1"/>
+          </p:cNvPicPr>
+          <p:nvPr/>
+        </p:nvPicPr>
+        <p:blipFill>
+          <a:blip r:embed="rId3"/>
+          <a:stretch>
+            <a:fillRect/>
+          </a:stretch>
+        </p:blipFill>
+        <p:spPr>
+          <a:xfrm>
+            <a:off x="2726685" y="3554506"/>
+            <a:ext cx="231668" cy="253006"/>
+          </a:xfrm>
+          <a:prstGeom prst="rect">
+            <a:avLst/>
+          </a:prstGeom>
+        </p:spPr>
+      </p:pic>
+      <p:pic>
+        <p:nvPicPr>
+          <p:cNvPr id="12" name="Imagem 11">
+            <a:extLst>
+              <a:ext uri="{FF2B5EF4-FFF2-40B4-BE49-F238E27FC236}">
+                <a16:creationId xmlns:a16="http://schemas.microsoft.com/office/drawing/2014/main" id="{0622FCCD-9D3A-4B1D-960E-1A26020C04A2}"/>
+              </a:ext>
+            </a:extLst>
+          </p:cNvPr>
+          <p:cNvPicPr>
+            <a:picLocks noChangeAspect="1"/>
+          </p:cNvPicPr>
+          <p:nvPr/>
+        </p:nvPicPr>
+        <p:blipFill>
+          <a:blip r:embed="rId4"/>
+          <a:stretch>
+            <a:fillRect/>
+          </a:stretch>
+        </p:blipFill>
+        <p:spPr>
+          <a:xfrm>
+            <a:off x="3139061" y="1519516"/>
+            <a:ext cx="231669" cy="253007"/>
+          </a:xfrm>
+          <a:prstGeom prst="rect">
+            <a:avLst/>
+          </a:prstGeom>
+        </p:spPr>
+      </p:pic>
+      <p:pic>
+        <p:nvPicPr>
+          <p:cNvPr id="13" name="Imagem 12">
+            <a:extLst>
+              <a:ext uri="{FF2B5EF4-FFF2-40B4-BE49-F238E27FC236}">
+                <a16:creationId xmlns:a16="http://schemas.microsoft.com/office/drawing/2014/main" id="{4BAA73F9-1CAF-456E-812A-D400803BF4E9}"/>
+              </a:ext>
+            </a:extLst>
+          </p:cNvPr>
+          <p:cNvPicPr>
+            <a:picLocks noChangeAspect="1"/>
+          </p:cNvPicPr>
+          <p:nvPr/>
+        </p:nvPicPr>
+        <p:blipFill>
+          <a:blip r:embed="rId5"/>
+          <a:stretch>
+            <a:fillRect/>
+          </a:stretch>
+        </p:blipFill>
+        <p:spPr>
+          <a:xfrm>
+            <a:off x="4689955" y="1125069"/>
+            <a:ext cx="231669" cy="253007"/>
+          </a:xfrm>
+          <a:prstGeom prst="rect">
+            <a:avLst/>
+          </a:prstGeom>
+        </p:spPr>
+      </p:pic>
+      <p:pic>
+        <p:nvPicPr>
+          <p:cNvPr id="14" name="Imagem 13">
+            <a:extLst>
+              <a:ext uri="{FF2B5EF4-FFF2-40B4-BE49-F238E27FC236}">
+                <a16:creationId xmlns:a16="http://schemas.microsoft.com/office/drawing/2014/main" id="{3021C11B-0497-48B7-AAD3-8AFC9EA41AC3}"/>
+              </a:ext>
+            </a:extLst>
+          </p:cNvPr>
+          <p:cNvPicPr>
+            <a:picLocks noChangeAspect="1"/>
+          </p:cNvPicPr>
+          <p:nvPr/>
+        </p:nvPicPr>
+        <p:blipFill>
+          <a:blip r:embed="rId6"/>
+          <a:stretch>
+            <a:fillRect/>
+          </a:stretch>
+        </p:blipFill>
+        <p:spPr>
+          <a:xfrm>
+            <a:off x="4689954" y="1519516"/>
+            <a:ext cx="231669" cy="253007"/>
+          </a:xfrm>
+          <a:prstGeom prst="rect">
+            <a:avLst/>
+          </a:prstGeom>
+        </p:spPr>
+      </p:pic>
+      <p:pic>
+        <p:nvPicPr>
+          <p:cNvPr id="18" name="Imagem 17">
+            <a:extLst>
+              <a:ext uri="{FF2B5EF4-FFF2-40B4-BE49-F238E27FC236}">
+                <a16:creationId xmlns:a16="http://schemas.microsoft.com/office/drawing/2014/main" id="{61AEA10C-BF8E-41C1-9342-CCECCD5A62F5}"/>
+              </a:ext>
+            </a:extLst>
+          </p:cNvPr>
+          <p:cNvPicPr>
+            <a:picLocks noChangeAspect="1"/>
+          </p:cNvPicPr>
+          <p:nvPr/>
+        </p:nvPicPr>
+        <p:blipFill>
+          <a:blip r:embed="rId7"/>
+          <a:stretch>
+            <a:fillRect/>
+          </a:stretch>
+        </p:blipFill>
+        <p:spPr>
+          <a:xfrm>
+            <a:off x="4689953" y="1913963"/>
+            <a:ext cx="231669" cy="253007"/>
+          </a:xfrm>
+          <a:prstGeom prst="rect">
+            <a:avLst/>
+          </a:prstGeom>
+        </p:spPr>
+      </p:pic>
+      <p:pic>
+        <p:nvPicPr>
+          <p:cNvPr id="19" name="Imagem 18">
+            <a:extLst>
+              <a:ext uri="{FF2B5EF4-FFF2-40B4-BE49-F238E27FC236}">
+                <a16:creationId xmlns:a16="http://schemas.microsoft.com/office/drawing/2014/main" id="{CCC3F691-EBC0-413F-9900-B2CD7F27DEA2}"/>
+              </a:ext>
+            </a:extLst>
+          </p:cNvPr>
+          <p:cNvPicPr>
+            <a:picLocks noChangeAspect="1"/>
+          </p:cNvPicPr>
+          <p:nvPr/>
+        </p:nvPicPr>
+        <p:blipFill>
+          <a:blip r:embed="rId8"/>
+          <a:stretch>
+            <a:fillRect/>
+          </a:stretch>
+        </p:blipFill>
+        <p:spPr>
+          <a:xfrm>
+            <a:off x="3254895" y="2714623"/>
+            <a:ext cx="231669" cy="253007"/>
+          </a:xfrm>
+          <a:prstGeom prst="rect">
+            <a:avLst/>
+          </a:prstGeom>
+        </p:spPr>
+      </p:pic>
+      <p:pic>
+        <p:nvPicPr>
+          <p:cNvPr id="20" name="Imagem 19">
+            <a:extLst>
+              <a:ext uri="{FF2B5EF4-FFF2-40B4-BE49-F238E27FC236}">
+                <a16:creationId xmlns:a16="http://schemas.microsoft.com/office/drawing/2014/main" id="{A6C34CB7-A14E-4C5D-96BE-2E866DBA70C0}"/>
+              </a:ext>
+            </a:extLst>
+          </p:cNvPr>
+          <p:cNvPicPr>
+            <a:picLocks noChangeAspect="1"/>
+          </p:cNvPicPr>
+          <p:nvPr/>
+        </p:nvPicPr>
+        <p:blipFill>
+          <a:blip r:embed="rId9"/>
+          <a:stretch>
+            <a:fillRect/>
+          </a:stretch>
+        </p:blipFill>
+        <p:spPr>
+          <a:xfrm>
+            <a:off x="4226032" y="2714623"/>
+            <a:ext cx="231669" cy="253007"/>
+          </a:xfrm>
+          <a:prstGeom prst="rect">
+            <a:avLst/>
+          </a:prstGeom>
+        </p:spPr>
+      </p:pic>
+      <p:pic>
+        <p:nvPicPr>
+          <p:cNvPr id="21" name="Imagem 20">
+            <a:extLst>
+              <a:ext uri="{FF2B5EF4-FFF2-40B4-BE49-F238E27FC236}">
+                <a16:creationId xmlns:a16="http://schemas.microsoft.com/office/drawing/2014/main" id="{EAA21FF5-F7D1-43D6-AE9D-0C49240EB700}"/>
+              </a:ext>
+            </a:extLst>
+          </p:cNvPr>
+          <p:cNvPicPr>
+            <a:picLocks noChangeAspect="1"/>
+          </p:cNvPicPr>
+          <p:nvPr/>
+        </p:nvPicPr>
+        <p:blipFill>
+          <a:blip r:embed="rId10"/>
+          <a:stretch>
+            <a:fillRect/>
+          </a:stretch>
+        </p:blipFill>
+        <p:spPr>
+          <a:xfrm>
+            <a:off x="6226282" y="3175993"/>
+            <a:ext cx="231669" cy="253007"/>
+          </a:xfrm>
+          <a:prstGeom prst="rect">
+            <a:avLst/>
+          </a:prstGeom>
+        </p:spPr>
+      </p:pic>
+      <p:pic>
+        <p:nvPicPr>
+          <p:cNvPr id="22" name="Imagem 21">
+            <a:extLst>
+              <a:ext uri="{FF2B5EF4-FFF2-40B4-BE49-F238E27FC236}">
+                <a16:creationId xmlns:a16="http://schemas.microsoft.com/office/drawing/2014/main" id="{815A39EF-9B58-4F86-A44B-059ADBB4CF53}"/>
+              </a:ext>
+            </a:extLst>
+          </p:cNvPr>
+          <p:cNvPicPr>
+            <a:picLocks noChangeAspect="1"/>
+          </p:cNvPicPr>
+          <p:nvPr/>
+        </p:nvPicPr>
+        <p:blipFill>
+          <a:blip r:embed="rId11"/>
+          <a:stretch>
+            <a:fillRect/>
+          </a:stretch>
+        </p:blipFill>
+        <p:spPr>
+          <a:xfrm>
+            <a:off x="854182" y="3876673"/>
+            <a:ext cx="231670" cy="253008"/>
+          </a:xfrm>
+          <a:prstGeom prst="rect">
+            <a:avLst/>
+          </a:prstGeom>
+        </p:spPr>
+      </p:pic>
+      <p:pic>
+        <p:nvPicPr>
+          <p:cNvPr id="24" name="Imagem 23">
+            <a:extLst>
+              <a:ext uri="{FF2B5EF4-FFF2-40B4-BE49-F238E27FC236}">
+                <a16:creationId xmlns:a16="http://schemas.microsoft.com/office/drawing/2014/main" id="{0F74C8CE-F4AF-462A-BD91-31DEDADDF533}"/>
+              </a:ext>
+            </a:extLst>
+          </p:cNvPr>
+          <p:cNvPicPr>
+            <a:picLocks noChangeAspect="1"/>
+          </p:cNvPicPr>
+          <p:nvPr/>
+        </p:nvPicPr>
+        <p:blipFill>
+          <a:blip r:embed="rId12"/>
+          <a:stretch>
+            <a:fillRect/>
+          </a:stretch>
+        </p:blipFill>
+        <p:spPr>
+          <a:xfrm>
+            <a:off x="607671" y="666748"/>
+            <a:ext cx="259105" cy="253008"/>
+          </a:xfrm>
+          <a:prstGeom prst="rect">
+            <a:avLst/>
+          </a:prstGeom>
+        </p:spPr>
+      </p:pic>
+    </p:spTree>
+    <p:extLst>
+      <p:ext uri="{BB962C8B-B14F-4D97-AF65-F5344CB8AC3E}">
+        <p14:creationId xmlns:p14="http://schemas.microsoft.com/office/powerpoint/2010/main" val="2500416726"/>
+      </p:ext>
+    </p:extLst>
+  </p:cSld>
+  <p:clrMapOvr>
+    <a:masterClrMapping/>
+  </p:clrMapOvr>
+</p:sld>
+</file>
+
+<file path=ppt/slides/slide7.xml><?xml version="1.0" encoding="utf-8"?>
+<p:sld xmlns:a="http://schemas.openxmlformats.org/drawingml/2006/main" xmlns:r="http://schemas.openxmlformats.org/officeDocument/2006/relationships" xmlns:p="http://schemas.openxmlformats.org/presentationml/2006/main">
+  <p:cSld>
+    <p:spTree>
+      <p:nvGrpSpPr>
+        <p:cNvPr id="1" name=""/>
+        <p:cNvGrpSpPr/>
+        <p:nvPr/>
+      </p:nvGrpSpPr>
+      <p:grpSpPr>
+        <a:xfrm>
+          <a:off x="0" y="0"/>
+          <a:ext cx="0" cy="0"/>
+          <a:chOff x="0" y="0"/>
+          <a:chExt cx="0" cy="0"/>
+        </a:xfrm>
+      </p:grpSpPr>
+      <p:sp>
+        <p:nvSpPr>
+          <p:cNvPr id="2" name="Título 1">
+            <a:extLst>
+              <a:ext uri="{FF2B5EF4-FFF2-40B4-BE49-F238E27FC236}">
+                <a16:creationId xmlns:a16="http://schemas.microsoft.com/office/drawing/2014/main" id="{979ABBE1-3CBC-411A-9147-A026C38954F9}"/>
+              </a:ext>
+            </a:extLst>
+          </p:cNvPr>
+          <p:cNvSpPr>
+            <a:spLocks noGrp="1"/>
+          </p:cNvSpPr>
+          <p:nvPr>
+            <p:ph type="title"/>
+          </p:nvPr>
+        </p:nvSpPr>
+        <p:spPr/>
+        <p:txBody>
+          <a:bodyPr/>
+          <a:lstStyle/>
+          <a:p>
+            <a:endParaRPr lang="pt-PT"/>
+          </a:p>
+        </p:txBody>
+      </p:sp>
+      <p:sp>
+        <p:nvSpPr>
+          <p:cNvPr id="3" name="Marcador de Posição de Conteúdo 2">
+            <a:extLst>
+              <a:ext uri="{FF2B5EF4-FFF2-40B4-BE49-F238E27FC236}">
+                <a16:creationId xmlns:a16="http://schemas.microsoft.com/office/drawing/2014/main" id="{969E629C-4017-4E10-91D9-DF9CE8607468}"/>
+              </a:ext>
+            </a:extLst>
+          </p:cNvPr>
+          <p:cNvSpPr>
+            <a:spLocks noGrp="1"/>
+          </p:cNvSpPr>
+          <p:nvPr>
+            <p:ph idx="1"/>
+          </p:nvPr>
+        </p:nvSpPr>
+        <p:spPr/>
+        <p:txBody>
+          <a:bodyPr/>
+          <a:lstStyle/>
+          <a:p>
+            <a:endParaRPr lang="pt-PT" dirty="0"/>
+          </a:p>
+        </p:txBody>
+      </p:sp>
+      <p:grpSp>
+        <p:nvGrpSpPr>
+          <p:cNvPr id="5" name="Agrupar 4">
+            <a:extLst>
+              <a:ext uri="{FF2B5EF4-FFF2-40B4-BE49-F238E27FC236}">
+                <a16:creationId xmlns:a16="http://schemas.microsoft.com/office/drawing/2014/main" id="{CD8F2092-748F-43A6-98C8-E2B72019583C}"/>
+              </a:ext>
+            </a:extLst>
+          </p:cNvPr>
+          <p:cNvGrpSpPr/>
+          <p:nvPr/>
+        </p:nvGrpSpPr>
+        <p:grpSpPr>
+          <a:xfrm>
+            <a:off x="8326530" y="4609675"/>
+            <a:ext cx="428625" cy="415603"/>
+            <a:chOff x="7743824" y="4394522"/>
+            <a:chExt cx="428625" cy="415603"/>
+          </a:xfrm>
+        </p:grpSpPr>
+        <p:sp>
+          <p:nvSpPr>
+            <p:cNvPr id="6" name="Oval 5">
+              <a:extLst>
+                <a:ext uri="{FF2B5EF4-FFF2-40B4-BE49-F238E27FC236}">
+                  <a16:creationId xmlns:a16="http://schemas.microsoft.com/office/drawing/2014/main" id="{ECDB9026-CB1F-4E21-80BE-411A7D5F43C3}"/>
+                </a:ext>
+              </a:extLst>
+            </p:cNvPr>
+            <p:cNvSpPr/>
+            <p:nvPr/>
+          </p:nvSpPr>
+          <p:spPr>
+            <a:xfrm>
+              <a:off x="7743824" y="4394522"/>
+              <a:ext cx="428625" cy="415603"/>
+            </a:xfrm>
+            <a:prstGeom prst="ellipse">
+              <a:avLst/>
+            </a:prstGeom>
+            <a:solidFill>
+              <a:schemeClr val="bg1"/>
+            </a:solidFill>
+            <a:ln w="38100">
+              <a:solidFill>
+                <a:srgbClr val="FF0000"/>
+              </a:solidFill>
+            </a:ln>
+          </p:spPr>
+          <p:style>
+            <a:lnRef idx="2">
+              <a:schemeClr val="accent1">
+                <a:shade val="50000"/>
+              </a:schemeClr>
+            </a:lnRef>
+            <a:fillRef idx="1">
+              <a:schemeClr val="accent1"/>
+            </a:fillRef>
+            <a:effectRef idx="0">
+              <a:schemeClr val="accent1"/>
+            </a:effectRef>
+            <a:fontRef idx="minor">
+              <a:schemeClr val="lt1"/>
+            </a:fontRef>
+          </p:style>
+          <p:txBody>
+            <a:bodyPr rtlCol="0" anchor="ctr"/>
+            <a:lstStyle/>
+            <a:p>
+              <a:pPr algn="ctr"/>
+              <a:endParaRPr lang="pt-PT" sz="600" dirty="0">
+                <a:solidFill>
+                  <a:schemeClr val="tx1"/>
+                </a:solidFill>
+              </a:endParaRPr>
+            </a:p>
+          </p:txBody>
+        </p:sp>
+        <p:sp>
+          <p:nvSpPr>
+            <p:cNvPr id="7" name="CaixaDeTexto 6">
+              <a:extLst>
+                <a:ext uri="{FF2B5EF4-FFF2-40B4-BE49-F238E27FC236}">
+                  <a16:creationId xmlns:a16="http://schemas.microsoft.com/office/drawing/2014/main" id="{1733EDEF-BAC1-44AB-A400-6C56B1C55018}"/>
+                </a:ext>
+              </a:extLst>
+            </p:cNvPr>
+            <p:cNvSpPr txBox="1"/>
+            <p:nvPr/>
+          </p:nvSpPr>
+          <p:spPr>
+            <a:xfrm>
+              <a:off x="7743824" y="4417657"/>
+              <a:ext cx="428625" cy="369332"/>
+            </a:xfrm>
+            <a:prstGeom prst="rect">
+              <a:avLst/>
+            </a:prstGeom>
+            <a:noFill/>
+          </p:spPr>
+          <p:txBody>
+            <a:bodyPr wrap="square" rtlCol="0">
+              <a:spAutoFit/>
+            </a:bodyPr>
+            <a:lstStyle/>
+            <a:p>
+              <a:r>
+                <a:rPr lang="pt-PT" dirty="0"/>
+                <a:t>10</a:t>
+              </a:r>
+            </a:p>
+          </p:txBody>
+        </p:sp>
+      </p:grpSp>
+    </p:spTree>
+    <p:extLst>
+      <p:ext uri="{BB962C8B-B14F-4D97-AF65-F5344CB8AC3E}">
+        <p14:creationId xmlns:p14="http://schemas.microsoft.com/office/powerpoint/2010/main" val="3321859657"/>
+      </p:ext>
+    </p:extLst>
+  </p:cSld>
+  <p:clrMapOvr>
+    <a:masterClrMapping/>
+  </p:clrMapOvr>
+</p:sld>
+</file>
+
+<file path=ppt/slides/slide8.xml><?xml version="1.0" encoding="utf-8"?>
+<p:sld xmlns:a="http://schemas.openxmlformats.org/drawingml/2006/main" xmlns:r="http://schemas.openxmlformats.org/officeDocument/2006/relationships" xmlns:p="http://schemas.openxmlformats.org/presentationml/2006/main">
+  <p:cSld>
+    <p:spTree>
+      <p:nvGrpSpPr>
+        <p:cNvPr id="1" name=""/>
+        <p:cNvGrpSpPr/>
+        <p:nvPr/>
+      </p:nvGrpSpPr>
+      <p:grpSpPr>
+        <a:xfrm>
+          <a:off x="0" y="0"/>
+          <a:ext cx="0" cy="0"/>
+          <a:chOff x="0" y="0"/>
+          <a:chExt cx="0" cy="0"/>
+        </a:xfrm>
+      </p:grpSpPr>
+      <p:sp>
+        <p:nvSpPr>
+          <p:cNvPr id="2" name="Título 1">
+            <a:extLst>
+              <a:ext uri="{FF2B5EF4-FFF2-40B4-BE49-F238E27FC236}">
+                <a16:creationId xmlns:a16="http://schemas.microsoft.com/office/drawing/2014/main" id="{E772C663-64F1-4E15-95DD-76C4F244D55B}"/>
+              </a:ext>
+            </a:extLst>
+          </p:cNvPr>
+          <p:cNvSpPr>
+            <a:spLocks noGrp="1"/>
+          </p:cNvSpPr>
+          <p:nvPr>
+            <p:ph type="title"/>
+          </p:nvPr>
+        </p:nvSpPr>
+        <p:spPr/>
+        <p:txBody>
+          <a:bodyPr/>
+          <a:lstStyle/>
+          <a:p>
+            <a:endParaRPr lang="pt-PT"/>
+          </a:p>
+        </p:txBody>
+      </p:sp>
+      <p:sp>
+        <p:nvSpPr>
+          <p:cNvPr id="3" name="Marcador de Posição de Conteúdo 2">
+            <a:extLst>
+              <a:ext uri="{FF2B5EF4-FFF2-40B4-BE49-F238E27FC236}">
+                <a16:creationId xmlns:a16="http://schemas.microsoft.com/office/drawing/2014/main" id="{B1764736-14D6-436B-AEC7-77EF539C1D53}"/>
+              </a:ext>
+            </a:extLst>
+          </p:cNvPr>
+          <p:cNvSpPr>
+            <a:spLocks noGrp="1"/>
+          </p:cNvSpPr>
+          <p:nvPr>
+            <p:ph idx="1"/>
+          </p:nvPr>
+        </p:nvSpPr>
+        <p:spPr/>
+        <p:txBody>
+          <a:bodyPr/>
+          <a:lstStyle/>
+          <a:p>
+            <a:endParaRPr lang="pt-PT"/>
+          </a:p>
+        </p:txBody>
+      </p:sp>
+    </p:spTree>
+    <p:extLst>
+      <p:ext uri="{BB962C8B-B14F-4D97-AF65-F5344CB8AC3E}">
+        <p14:creationId xmlns:p14="http://schemas.microsoft.com/office/powerpoint/2010/main" val="2555296147"/>
+      </p:ext>
+    </p:extLst>
+  </p:cSld>
+  <p:clrMapOvr>
+    <a:masterClrMapping/>
+  </p:clrMapOvr>
+</p:sld>
+</file>
+
+<file path=ppt/slides/slide9.xml><?xml version="1.0" encoding="utf-8"?>
+<p:sld xmlns:a="http://schemas.openxmlformats.org/drawingml/2006/main" xmlns:r="http://schemas.openxmlformats.org/officeDocument/2006/relationships" xmlns:p="http://schemas.openxmlformats.org/presentationml/2006/main">
+  <p:cSld>
+    <p:spTree>
+      <p:nvGrpSpPr>
+        <p:cNvPr id="1" name=""/>
+        <p:cNvGrpSpPr/>
+        <p:nvPr/>
+      </p:nvGrpSpPr>
+      <p:grpSpPr>
+        <a:xfrm>
+          <a:off x="0" y="0"/>
+          <a:ext cx="0" cy="0"/>
+          <a:chOff x="0" y="0"/>
+          <a:chExt cx="0" cy="0"/>
+        </a:xfrm>
+      </p:grpSpPr>
+      <p:sp>
+        <p:nvSpPr>
+          <p:cNvPr id="2" name="Título 1">
+            <a:extLst>
+              <a:ext uri="{FF2B5EF4-FFF2-40B4-BE49-F238E27FC236}">
+                <a16:creationId xmlns:a16="http://schemas.microsoft.com/office/drawing/2014/main" id="{4D9E784F-7BF8-4588-9F52-93F39837C571}"/>
+              </a:ext>
+            </a:extLst>
+          </p:cNvPr>
+          <p:cNvSpPr>
+            <a:spLocks noGrp="1"/>
+          </p:cNvSpPr>
+          <p:nvPr>
+            <p:ph type="title"/>
+          </p:nvPr>
+        </p:nvSpPr>
+        <p:spPr/>
+        <p:txBody>
+          <a:bodyPr/>
+          <a:lstStyle/>
+          <a:p>
+            <a:endParaRPr lang="pt-PT"/>
+          </a:p>
+        </p:txBody>
+      </p:sp>
+      <p:sp>
+        <p:nvSpPr>
+          <p:cNvPr id="3" name="Marcador de Posição de Conteúdo 2">
+            <a:extLst>
+              <a:ext uri="{FF2B5EF4-FFF2-40B4-BE49-F238E27FC236}">
+                <a16:creationId xmlns:a16="http://schemas.microsoft.com/office/drawing/2014/main" id="{57E5A63C-0F4F-4594-8201-FA21EFCE2064}"/>
+              </a:ext>
+            </a:extLst>
+          </p:cNvPr>
+          <p:cNvSpPr>
+            <a:spLocks noGrp="1"/>
+          </p:cNvSpPr>
+          <p:nvPr>
+            <p:ph idx="1"/>
+          </p:nvPr>
+        </p:nvSpPr>
+        <p:spPr/>
+        <p:txBody>
+          <a:bodyPr/>
+          <a:lstStyle/>
+          <a:p>
+            <a:endParaRPr lang="pt-PT"/>
+          </a:p>
+        </p:txBody>
+      </p:sp>
+    </p:spTree>
+    <p:extLst>
+      <p:ext uri="{BB962C8B-B14F-4D97-AF65-F5344CB8AC3E}">
+        <p14:creationId xmlns:p14="http://schemas.microsoft.com/office/powerpoint/2010/main" val="3422646221"/>
+      </p:ext>
+    </p:extLst>
+  </p:cSld>
+  <p:clrMapOvr>
+    <a:masterClrMapping/>
+  </p:clrMapOvr>
+</p:sld>
+</file>
+
 <file path=ppt/theme/theme1.xml><?xml version="1.0" encoding="utf-8"?>
 <a:theme xmlns:a="http://schemas.openxmlformats.org/drawingml/2006/main" name="Tema do Office">
   <a:themeElements>

</xml_diff>